<commit_message>
Updated to include additional information
</commit_message>
<xml_diff>
--- a/documentation/Mid Term Demo Presentation.pptx
+++ b/documentation/Mid Term Demo Presentation.pptx
@@ -5,7 +5,7 @@
     <p:sldMasterId id="2147483648" r:id="rId1"/>
   </p:sldMasterIdLst>
   <p:notesMasterIdLst>
-    <p:notesMasterId r:id="rId17"/>
+    <p:notesMasterId r:id="rId18"/>
   </p:notesMasterIdLst>
   <p:sldIdLst>
     <p:sldId id="256" r:id="rId2"/>
@@ -17,12 +17,13 @@
     <p:sldId id="263" r:id="rId8"/>
     <p:sldId id="262" r:id="rId9"/>
     <p:sldId id="259" r:id="rId10"/>
-    <p:sldId id="265" r:id="rId11"/>
-    <p:sldId id="266" r:id="rId12"/>
-    <p:sldId id="267" r:id="rId13"/>
-    <p:sldId id="260" r:id="rId14"/>
-    <p:sldId id="270" r:id="rId15"/>
-    <p:sldId id="268" r:id="rId16"/>
+    <p:sldId id="271" r:id="rId11"/>
+    <p:sldId id="265" r:id="rId12"/>
+    <p:sldId id="266" r:id="rId13"/>
+    <p:sldId id="267" r:id="rId14"/>
+    <p:sldId id="260" r:id="rId15"/>
+    <p:sldId id="270" r:id="rId16"/>
+    <p:sldId id="268" r:id="rId17"/>
   </p:sldIdLst>
   <p:sldSz cx="12192000" cy="6858000"/>
   <p:notesSz cx="6858000" cy="9144000"/>
@@ -3420,87 +3421,47 @@
           <a:lstStyle/>
           <a:p>
             <a:r>
-              <a:rPr lang="en-US" dirty="0" err="1" smtClean="0"/>
-              <a:t>Optimised</a:t>
-            </a:r>
-            <a:r>
               <a:rPr lang="en-US" dirty="0" smtClean="0"/>
-              <a:t> Journey Planner</a:t>
+              <a:t>Database ER Diagram</a:t>
             </a:r>
             <a:endParaRPr lang="en-US" dirty="0"/>
           </a:p>
         </p:txBody>
       </p:sp>
-      <p:sp>
-        <p:nvSpPr>
-          <p:cNvPr id="3" name="Content Placeholder 2"/>
-          <p:cNvSpPr>
-            <a:spLocks noGrp="1"/>
-          </p:cNvSpPr>
-          <p:nvPr>
-            <p:ph idx="1"/>
-          </p:nvPr>
-        </p:nvSpPr>
-        <p:spPr/>
-        <p:txBody>
-          <a:bodyPr/>
-          <a:lstStyle/>
-          <a:p>
-            <a:r>
-              <a:rPr lang="en-US" dirty="0" smtClean="0"/>
-              <a:t>Produces an </a:t>
-            </a:r>
-            <a:r>
-              <a:rPr lang="en-US" dirty="0" err="1" smtClean="0"/>
-              <a:t>optimised</a:t>
-            </a:r>
-            <a:r>
-              <a:rPr lang="en-US" dirty="0" smtClean="0"/>
-              <a:t> timetable of activities in destination based on:</a:t>
-            </a:r>
-          </a:p>
-          <a:p>
-            <a:pPr lvl="1"/>
-            <a:r>
-              <a:rPr lang="en-US" dirty="0" smtClean="0"/>
-              <a:t>Personal interests</a:t>
-            </a:r>
-          </a:p>
-          <a:p>
-            <a:pPr lvl="1"/>
-            <a:r>
-              <a:rPr lang="en-US" dirty="0" smtClean="0"/>
-              <a:t>Popularity of attractions</a:t>
-            </a:r>
-          </a:p>
-          <a:p>
-            <a:pPr lvl="1"/>
-            <a:r>
-              <a:rPr lang="en-US" dirty="0" smtClean="0"/>
-              <a:t>Best times to visit</a:t>
-            </a:r>
-          </a:p>
-          <a:p>
-            <a:pPr lvl="1"/>
-            <a:r>
-              <a:rPr lang="en-US" dirty="0" smtClean="0"/>
-              <a:t>Accessibility requirements</a:t>
-            </a:r>
-          </a:p>
-          <a:p>
-            <a:pPr lvl="1"/>
-            <a:r>
-              <a:rPr lang="en-US" dirty="0" smtClean="0"/>
-              <a:t>Level of activity</a:t>
-            </a:r>
-            <a:endParaRPr lang="en-US" dirty="0"/>
-          </a:p>
-        </p:txBody>
-      </p:sp>
+      <p:pic>
+        <p:nvPicPr>
+          <p:cNvPr id="4" name="Picture 3"/>
+          <p:cNvPicPr>
+            <a:picLocks noChangeAspect="1"/>
+          </p:cNvPicPr>
+          <p:nvPr/>
+        </p:nvPicPr>
+        <p:blipFill>
+          <a:blip r:embed="rId2">
+            <a:extLst>
+              <a:ext uri="{28A0092B-C50C-407E-A947-70E740481C1C}">
+                <a14:useLocalDpi xmlns:a14="http://schemas.microsoft.com/office/drawing/2010/main" val="0"/>
+              </a:ext>
+            </a:extLst>
+          </a:blip>
+          <a:stretch>
+            <a:fillRect/>
+          </a:stretch>
+        </p:blipFill>
+        <p:spPr>
+          <a:xfrm>
+            <a:off x="3635502" y="1440270"/>
+            <a:ext cx="4920996" cy="5210466"/>
+          </a:xfrm>
+          <a:prstGeom prst="rect">
+            <a:avLst/>
+          </a:prstGeom>
+        </p:spPr>
+      </p:pic>
     </p:spTree>
     <p:extLst>
       <p:ext uri="{BB962C8B-B14F-4D97-AF65-F5344CB8AC3E}">
-        <p14:creationId xmlns:p14="http://schemas.microsoft.com/office/powerpoint/2010/main" val="211648092"/>
+        <p14:creationId xmlns:p14="http://schemas.microsoft.com/office/powerpoint/2010/main" val="1126804208"/>
       </p:ext>
     </p:extLst>
   </p:cSld>
@@ -3543,12 +3504,12 @@
           <a:lstStyle/>
           <a:p>
             <a:r>
+              <a:rPr lang="en-US" dirty="0" err="1" smtClean="0"/>
+              <a:t>Optimised</a:t>
+            </a:r>
+            <a:r>
               <a:rPr lang="en-US" dirty="0" smtClean="0"/>
-              <a:t>Activities </a:t>
-            </a:r>
-            <a:r>
-              <a:rPr lang="en-US" dirty="0" err="1" smtClean="0"/>
-              <a:t>Heatmap</a:t>
+              <a:t> Journey Planner</a:t>
             </a:r>
             <a:endParaRPr lang="en-US" dirty="0"/>
           </a:p>
@@ -3571,14 +3532,7 @@
           <a:p>
             <a:r>
               <a:rPr lang="en-US" dirty="0" smtClean="0"/>
-              <a:t>Takes statistics on activity popularity and displays them in an interactive, visual way</a:t>
-            </a:r>
-          </a:p>
-          <a:p>
-            <a:pPr lvl="1"/>
-            <a:r>
-              <a:rPr lang="en-US" dirty="0" smtClean="0"/>
-              <a:t>Can be used to make decisions about activities for </a:t>
+              <a:t>Produces an </a:t>
             </a:r>
             <a:r>
               <a:rPr lang="en-US" dirty="0" err="1" smtClean="0"/>
@@ -3586,14 +3540,42 @@
             </a:r>
             <a:r>
               <a:rPr lang="en-US" dirty="0" smtClean="0"/>
-              <a:t> timetables</a:t>
+              <a:t> timetable of activities in destination based on:</a:t>
             </a:r>
           </a:p>
           <a:p>
             <a:pPr lvl="1"/>
             <a:r>
               <a:rPr lang="en-US" dirty="0" smtClean="0"/>
-              <a:t>Make instantaneous decisions based on live information</a:t>
+              <a:t>Personal interests</a:t>
+            </a:r>
+          </a:p>
+          <a:p>
+            <a:pPr lvl="1"/>
+            <a:r>
+              <a:rPr lang="en-US" dirty="0" smtClean="0"/>
+              <a:t>Popularity of attractions</a:t>
+            </a:r>
+          </a:p>
+          <a:p>
+            <a:pPr lvl="1"/>
+            <a:r>
+              <a:rPr lang="en-US" dirty="0" smtClean="0"/>
+              <a:t>Best times to visit</a:t>
+            </a:r>
+          </a:p>
+          <a:p>
+            <a:pPr lvl="1"/>
+            <a:r>
+              <a:rPr lang="en-US" dirty="0" smtClean="0"/>
+              <a:t>Accessibility requirements</a:t>
+            </a:r>
+          </a:p>
+          <a:p>
+            <a:pPr lvl="1"/>
+            <a:r>
+              <a:rPr lang="en-US" dirty="0" smtClean="0"/>
+              <a:t>Level of activity</a:t>
             </a:r>
             <a:endParaRPr lang="en-US" dirty="0"/>
           </a:p>
@@ -3602,7 +3584,7 @@
     </p:spTree>
     <p:extLst>
       <p:ext uri="{BB962C8B-B14F-4D97-AF65-F5344CB8AC3E}">
-        <p14:creationId xmlns:p14="http://schemas.microsoft.com/office/powerpoint/2010/main" val="936562812"/>
+        <p14:creationId xmlns:p14="http://schemas.microsoft.com/office/powerpoint/2010/main" val="211648092"/>
       </p:ext>
     </p:extLst>
   </p:cSld>
@@ -3646,7 +3628,11 @@
           <a:p>
             <a:r>
               <a:rPr lang="en-US" dirty="0" smtClean="0"/>
-              <a:t>Local Tour Guide Matching System</a:t>
+              <a:t>Activities </a:t>
+            </a:r>
+            <a:r>
+              <a:rPr lang="en-US" dirty="0" err="1" smtClean="0"/>
+              <a:t>Heatmap</a:t>
             </a:r>
             <a:endParaRPr lang="en-US" dirty="0"/>
           </a:p>
@@ -3669,63 +3655,29 @@
           <a:p>
             <a:r>
               <a:rPr lang="en-US" dirty="0" smtClean="0"/>
-              <a:t>Matches </a:t>
+              <a:t>Takes statistics on activity popularity and displays them in an interactive, visual way</a:t>
+            </a:r>
+          </a:p>
+          <a:p>
+            <a:pPr lvl="1"/>
+            <a:r>
+              <a:rPr lang="en-US" dirty="0" smtClean="0"/>
+              <a:t>Can be used to make decisions about activities for </a:t>
             </a:r>
             <a:r>
               <a:rPr lang="en-US" dirty="0" err="1" smtClean="0"/>
-              <a:t>travellers</a:t>
+              <a:t>optimised</a:t>
             </a:r>
             <a:r>
               <a:rPr lang="en-US" dirty="0" smtClean="0"/>
-              <a:t> with local people at each destination</a:t>
-            </a:r>
-          </a:p>
-          <a:p>
+              <a:t> timetables</a:t>
+            </a:r>
+          </a:p>
+          <a:p>
+            <a:pPr lvl="1"/>
             <a:r>
               <a:rPr lang="en-US" dirty="0" smtClean="0"/>
-              <a:t>Incorporates aspects such as:</a:t>
-            </a:r>
-          </a:p>
-          <a:p>
-            <a:pPr lvl="1"/>
-            <a:r>
-              <a:rPr lang="en-US" dirty="0" smtClean="0"/>
-              <a:t>Location</a:t>
-            </a:r>
-          </a:p>
-          <a:p>
-            <a:pPr lvl="1"/>
-            <a:r>
-              <a:rPr lang="en-US" dirty="0" smtClean="0"/>
-              <a:t>Timing</a:t>
-            </a:r>
-          </a:p>
-          <a:p>
-            <a:pPr lvl="1"/>
-            <a:r>
-              <a:rPr lang="en-US" dirty="0" smtClean="0"/>
-              <a:t>Languages Spoken</a:t>
-            </a:r>
-          </a:p>
-          <a:p>
-            <a:pPr lvl="1"/>
-            <a:r>
-              <a:rPr lang="en-US" dirty="0" smtClean="0"/>
-              <a:t>Personal Preferences</a:t>
-            </a:r>
-          </a:p>
-          <a:p>
-            <a:pPr lvl="1"/>
-            <a:r>
-              <a:rPr lang="en-US" dirty="0" smtClean="0"/>
-              <a:t>Activity Level</a:t>
-            </a:r>
-          </a:p>
-          <a:p>
-            <a:pPr lvl="1"/>
-            <a:r>
-              <a:rPr lang="en-US" dirty="0" err="1" smtClean="0"/>
-              <a:t>Accessibilty</a:t>
+              <a:t>Make instantaneous decisions based on live information</a:t>
             </a:r>
             <a:endParaRPr lang="en-US" dirty="0"/>
           </a:p>
@@ -3734,7 +3686,7 @@
     </p:spTree>
     <p:extLst>
       <p:ext uri="{BB962C8B-B14F-4D97-AF65-F5344CB8AC3E}">
-        <p14:creationId xmlns:p14="http://schemas.microsoft.com/office/powerpoint/2010/main" val="1903532421"/>
+        <p14:creationId xmlns:p14="http://schemas.microsoft.com/office/powerpoint/2010/main" val="936562812"/>
       </p:ext>
     </p:extLst>
   </p:cSld>
@@ -3778,6 +3730,138 @@
           <a:p>
             <a:r>
               <a:rPr lang="en-US" dirty="0" smtClean="0"/>
+              <a:t>Local Tour Guide Matching System</a:t>
+            </a:r>
+            <a:endParaRPr lang="en-US" dirty="0"/>
+          </a:p>
+        </p:txBody>
+      </p:sp>
+      <p:sp>
+        <p:nvSpPr>
+          <p:cNvPr id="3" name="Content Placeholder 2"/>
+          <p:cNvSpPr>
+            <a:spLocks noGrp="1"/>
+          </p:cNvSpPr>
+          <p:nvPr>
+            <p:ph idx="1"/>
+          </p:nvPr>
+        </p:nvSpPr>
+        <p:spPr/>
+        <p:txBody>
+          <a:bodyPr/>
+          <a:lstStyle/>
+          <a:p>
+            <a:r>
+              <a:rPr lang="en-US" dirty="0" smtClean="0"/>
+              <a:t>Matches </a:t>
+            </a:r>
+            <a:r>
+              <a:rPr lang="en-US" dirty="0" err="1" smtClean="0"/>
+              <a:t>travellers</a:t>
+            </a:r>
+            <a:r>
+              <a:rPr lang="en-US" dirty="0" smtClean="0"/>
+              <a:t> with local people at each destination</a:t>
+            </a:r>
+          </a:p>
+          <a:p>
+            <a:r>
+              <a:rPr lang="en-US" dirty="0" smtClean="0"/>
+              <a:t>Incorporates aspects such as:</a:t>
+            </a:r>
+          </a:p>
+          <a:p>
+            <a:pPr lvl="1"/>
+            <a:r>
+              <a:rPr lang="en-US" dirty="0" smtClean="0"/>
+              <a:t>Location</a:t>
+            </a:r>
+          </a:p>
+          <a:p>
+            <a:pPr lvl="1"/>
+            <a:r>
+              <a:rPr lang="en-US" dirty="0" smtClean="0"/>
+              <a:t>Timing</a:t>
+            </a:r>
+          </a:p>
+          <a:p>
+            <a:pPr lvl="1"/>
+            <a:r>
+              <a:rPr lang="en-US" dirty="0" smtClean="0"/>
+              <a:t>Languages Spoken</a:t>
+            </a:r>
+          </a:p>
+          <a:p>
+            <a:pPr lvl="1"/>
+            <a:r>
+              <a:rPr lang="en-US" dirty="0" smtClean="0"/>
+              <a:t>Personal Preferences</a:t>
+            </a:r>
+          </a:p>
+          <a:p>
+            <a:pPr lvl="1"/>
+            <a:r>
+              <a:rPr lang="en-US" dirty="0" smtClean="0"/>
+              <a:t>Activity Level</a:t>
+            </a:r>
+          </a:p>
+          <a:p>
+            <a:pPr lvl="1"/>
+            <a:r>
+              <a:rPr lang="en-US" dirty="0" err="1" smtClean="0"/>
+              <a:t>Accessibilty</a:t>
+            </a:r>
+            <a:endParaRPr lang="en-US" dirty="0"/>
+          </a:p>
+        </p:txBody>
+      </p:sp>
+    </p:spTree>
+    <p:extLst>
+      <p:ext uri="{BB962C8B-B14F-4D97-AF65-F5344CB8AC3E}">
+        <p14:creationId xmlns:p14="http://schemas.microsoft.com/office/powerpoint/2010/main" val="1903532421"/>
+      </p:ext>
+    </p:extLst>
+  </p:cSld>
+  <p:clrMapOvr>
+    <a:masterClrMapping/>
+  </p:clrMapOvr>
+</p:sld>
+</file>
+
+<file path=ppt/slides/slide14.xml><?xml version="1.0" encoding="utf-8"?>
+<p:sld xmlns:a="http://schemas.openxmlformats.org/drawingml/2006/main" xmlns:r="http://schemas.openxmlformats.org/officeDocument/2006/relationships" xmlns:p="http://schemas.openxmlformats.org/presentationml/2006/main">
+  <p:cSld>
+    <p:spTree>
+      <p:nvGrpSpPr>
+        <p:cNvPr id="1" name=""/>
+        <p:cNvGrpSpPr/>
+        <p:nvPr/>
+      </p:nvGrpSpPr>
+      <p:grpSpPr>
+        <a:xfrm>
+          <a:off x="0" y="0"/>
+          <a:ext cx="0" cy="0"/>
+          <a:chOff x="0" y="0"/>
+          <a:chExt cx="0" cy="0"/>
+        </a:xfrm>
+      </p:grpSpPr>
+      <p:sp>
+        <p:nvSpPr>
+          <p:cNvPr id="2" name="Title 1"/>
+          <p:cNvSpPr>
+            <a:spLocks noGrp="1"/>
+          </p:cNvSpPr>
+          <p:nvPr>
+            <p:ph type="title"/>
+          </p:nvPr>
+        </p:nvSpPr>
+        <p:spPr/>
+        <p:txBody>
+          <a:bodyPr/>
+          <a:lstStyle/>
+          <a:p>
+            <a:r>
+              <a:rPr lang="en-US" dirty="0" smtClean="0"/>
               <a:t>Retrospective</a:t>
             </a:r>
             <a:endParaRPr lang="en-US" dirty="0"/>
@@ -3793,14 +3877,14 @@
           <p:nvPr>
             <p:extLst>
               <p:ext uri="{D42A27DB-BD31-4B8C-83A1-F6EECF244321}">
-                <p14:modId xmlns:p14="http://schemas.microsoft.com/office/powerpoint/2010/main" val="756909957"/>
+                <p14:modId xmlns:p14="http://schemas.microsoft.com/office/powerpoint/2010/main" val="1922717916"/>
               </p:ext>
             </p:extLst>
           </p:nvPr>
         </p:nvGraphicFramePr>
         <p:xfrm>
           <a:off x="1711367" y="1963020"/>
-          <a:ext cx="8128000" cy="3484880"/>
+          <a:ext cx="8128000" cy="3114040"/>
         </p:xfrm>
         <a:graphic>
           <a:graphicData uri="http://schemas.openxmlformats.org/drawingml/2006/table">
@@ -3923,128 +4007,12 @@
                     <a:lstStyle/>
                     <a:p>
                       <a:r>
-                        <a:rPr lang="en-US" dirty="0" err="1" smtClean="0"/>
-                        <a:t>Organising</a:t>
-                      </a:r>
-                      <a:r>
                         <a:rPr lang="en-US" dirty="0" smtClean="0"/>
-                        <a:t> User Login Sessions</a:t>
-                      </a:r>
-                      <a:endParaRPr lang="en-US" dirty="0"/>
-                    </a:p>
-                  </a:txBody>
-                  <a:tcPr>
-                    <a:lnL w="12700" cap="flat" cmpd="sng" algn="ctr">
-                      <a:solidFill>
-                        <a:schemeClr val="tx1"/>
-                      </a:solidFill>
-                      <a:prstDash val="solid"/>
-                      <a:round/>
-                      <a:headEnd type="none" w="med" len="med"/>
-                      <a:tailEnd type="none" w="med" len="med"/>
-                    </a:lnL>
-                    <a:lnR w="12700" cap="flat" cmpd="sng" algn="ctr">
-                      <a:solidFill>
-                        <a:schemeClr val="tx1"/>
-                      </a:solidFill>
-                      <a:prstDash val="solid"/>
-                      <a:round/>
-                      <a:headEnd type="none" w="med" len="med"/>
-                      <a:tailEnd type="none" w="med" len="med"/>
-                    </a:lnR>
-                    <a:lnT w="12700" cap="flat" cmpd="sng" algn="ctr">
-                      <a:solidFill>
-                        <a:schemeClr val="tx1"/>
-                      </a:solidFill>
-                      <a:prstDash val="solid"/>
-                      <a:round/>
-                      <a:headEnd type="none" w="med" len="med"/>
-                      <a:tailEnd type="none" w="med" len="med"/>
-                    </a:lnT>
-                    <a:lnB w="12700" cap="flat" cmpd="sng" algn="ctr">
-                      <a:solidFill>
-                        <a:schemeClr val="tx1"/>
-                      </a:solidFill>
-                      <a:prstDash val="solid"/>
-                      <a:round/>
-                      <a:headEnd type="none" w="med" len="med"/>
-                      <a:tailEnd type="none" w="med" len="med"/>
-                    </a:lnB>
-                  </a:tcPr>
-                </a:tc>
-                <a:tc>
-                  <a:txBody>
-                    <a:bodyPr/>
-                    <a:lstStyle/>
-                    <a:p>
-                      <a:endParaRPr lang="en-US" dirty="0"/>
-                    </a:p>
-                  </a:txBody>
-                  <a:tcPr>
-                    <a:lnL w="12700" cap="flat" cmpd="sng" algn="ctr">
-                      <a:solidFill>
-                        <a:schemeClr val="tx1"/>
-                      </a:solidFill>
-                      <a:prstDash val="solid"/>
-                      <a:round/>
-                      <a:headEnd type="none" w="med" len="med"/>
-                      <a:tailEnd type="none" w="med" len="med"/>
-                    </a:lnL>
-                    <a:lnR w="12700" cap="flat" cmpd="sng" algn="ctr">
-                      <a:solidFill>
-                        <a:schemeClr val="tx1"/>
-                      </a:solidFill>
-                      <a:prstDash val="solid"/>
-                      <a:round/>
-                      <a:headEnd type="none" w="med" len="med"/>
-                      <a:tailEnd type="none" w="med" len="med"/>
-                    </a:lnR>
-                    <a:lnT w="12700" cap="flat" cmpd="sng" algn="ctr">
-                      <a:solidFill>
-                        <a:schemeClr val="tx1"/>
-                      </a:solidFill>
-                      <a:prstDash val="solid"/>
-                      <a:round/>
-                      <a:headEnd type="none" w="med" len="med"/>
-                      <a:tailEnd type="none" w="med" len="med"/>
-                    </a:lnT>
-                    <a:lnB w="12700" cap="flat" cmpd="sng" algn="ctr">
-                      <a:solidFill>
-                        <a:schemeClr val="tx1"/>
-                      </a:solidFill>
-                      <a:prstDash val="solid"/>
-                      <a:round/>
-                      <a:headEnd type="none" w="med" len="med"/>
-                      <a:tailEnd type="none" w="med" len="med"/>
-                    </a:lnB>
-                  </a:tcPr>
-                </a:tc>
-              </a:tr>
-              <a:tr h="370840">
-                <a:tc>
-                  <a:txBody>
-                    <a:bodyPr/>
-                    <a:lstStyle/>
-                    <a:p>
-                      <a:r>
-                        <a:rPr lang="en-US" dirty="0" smtClean="0"/>
-                        <a:t>Linking </a:t>
-                      </a:r>
-                      <a:r>
-                        <a:rPr lang="en-US" dirty="0" smtClean="0"/>
-                        <a:t>J</a:t>
+                        <a:t>Linking J</a:t>
                       </a:r>
                       <a:r>
                         <a:rPr lang="en-US" baseline="0" dirty="0" smtClean="0"/>
-                        <a:t>ourney </a:t>
-                      </a:r>
-                      <a:r>
-                        <a:rPr lang="en-US" baseline="0" dirty="0" smtClean="0"/>
-                        <a:t>Planner to </a:t>
-                      </a:r>
-                      <a:r>
-                        <a:rPr lang="en-US" baseline="0" dirty="0" smtClean="0"/>
-                        <a:t>Database </a:t>
+                        <a:t>ourney Planner to Database </a:t>
                       </a:r>
                       <a:r>
                         <a:rPr lang="mr-IN" baseline="0" dirty="0" smtClean="0"/>
@@ -4409,7 +4377,7 @@
 </p:sld>
 </file>
 
-<file path=ppt/slides/slide14.xml><?xml version="1.0" encoding="utf-8"?>
+<file path=ppt/slides/slide15.xml><?xml version="1.0" encoding="utf-8"?>
 <p:sld xmlns:a="http://schemas.openxmlformats.org/drawingml/2006/main" xmlns:r="http://schemas.openxmlformats.org/officeDocument/2006/relationships" xmlns:p="http://schemas.openxmlformats.org/presentationml/2006/main">
   <p:cSld>
     <p:spTree>
@@ -4602,23 +4570,7 @@
                       </a:pPr>
                       <a:r>
                         <a:rPr lang="en-US" baseline="0" dirty="0" smtClean="0"/>
-                        <a:t>Clear communication is key. Found that messaging </a:t>
-                      </a:r>
-                      <a:r>
-                        <a:rPr lang="en-US" baseline="0" dirty="0" smtClean="0"/>
-                        <a:t>a group chat when working on a </a:t>
-                      </a:r>
-                      <a:r>
-                        <a:rPr lang="en-US" baseline="0" dirty="0" smtClean="0"/>
-                        <a:t>document (so </a:t>
-                      </a:r>
-                      <a:r>
-                        <a:rPr lang="en-US" baseline="0" dirty="0" smtClean="0"/>
-                        <a:t>that only one person is working on a document at any </a:t>
-                      </a:r>
-                      <a:r>
-                        <a:rPr lang="en-US" baseline="0" dirty="0" smtClean="0"/>
-                        <a:t>time) was efficient for a small group</a:t>
+                        <a:t>Clear communication is key. Found that messaging a group chat when working on a document (so that only one person is working on a document at any time) was efficient for a small group</a:t>
                       </a:r>
                     </a:p>
                     <a:p>
@@ -4704,11 +4656,7 @@
                       </a:pPr>
                       <a:r>
                         <a:rPr lang="en-US" dirty="0" smtClean="0"/>
-                        <a:t>GitHub merge </a:t>
-                      </a:r>
-                      <a:r>
-                        <a:rPr lang="en-US" dirty="0" smtClean="0"/>
-                        <a:t>conflicts</a:t>
+                        <a:t>GitHub merge conflicts</a:t>
                       </a:r>
                     </a:p>
                     <a:p>
@@ -4826,7 +4774,7 @@
 </p:sld>
 </file>
 
-<file path=ppt/slides/slide15.xml><?xml version="1.0" encoding="utf-8"?>
+<file path=ppt/slides/slide16.xml><?xml version="1.0" encoding="utf-8"?>
 <p:sld xmlns:a="http://schemas.openxmlformats.org/drawingml/2006/main" xmlns:r="http://schemas.openxmlformats.org/officeDocument/2006/relationships" xmlns:p="http://schemas.openxmlformats.org/presentationml/2006/main">
   <p:cSld>
     <p:spTree>

</xml_diff>